<commit_message>
Filling out some fields
</commit_message>
<xml_diff>
--- a/final/final_presentation.pptx
+++ b/final/final_presentation.pptx
@@ -1123,7 +1123,7 @@
                 <a:srgbClr val="FF0000"/>
               </a:solidFill>
             </a:rPr>
-            <a:t>*Need to update</a:t>
+            <a:t>Trim Data</a:t>
           </a:r>
         </a:p>
       </dgm:t>
@@ -1238,10 +1238,10 @@
           <a:r>
             <a:rPr lang="en-US" sz="1400" b="0" dirty="0">
               <a:solidFill>
-                <a:srgbClr val="FF0000"/>
+                <a:schemeClr val="tx1"/>
               </a:solidFill>
             </a:rPr>
-            <a:t>*Need to Update</a:t>
+            <a:t>Choose Graphs of best fit</a:t>
           </a:r>
         </a:p>
       </dgm:t>
@@ -1354,10 +1354,10 @@
           <a:r>
             <a:rPr lang="en-US" sz="1400" b="0" dirty="0">
               <a:solidFill>
-                <a:srgbClr val="FF0000"/>
+                <a:schemeClr val="tx1"/>
               </a:solidFill>
             </a:rPr>
-            <a:t>*Need to Update</a:t>
+            <a:t>Use Graphs to spot trends</a:t>
           </a:r>
         </a:p>
       </dgm:t>
@@ -1636,6 +1636,25 @@
         </a:p>
       </dgm:t>
     </dgm:pt>
+    <dgm:pt modelId="{0336D323-6245-634F-B716-9221B6DC46A7}">
+      <dgm:prSet/>
+      <dgm:spPr/>
+      <dgm:t>
+        <a:bodyPr/>
+        <a:lstStyle/>
+        <a:p>
+          <a:endParaRPr lang="en-US"/>
+        </a:p>
+      </dgm:t>
+    </dgm:pt>
+    <dgm:pt modelId="{76EBCC91-E722-F949-AE8E-1B904140F7D5}" type="parTrans" cxnId="{139D7646-AEC5-3549-B0E9-279ECFBA1658}">
+      <dgm:prSet/>
+      <dgm:spPr/>
+    </dgm:pt>
+    <dgm:pt modelId="{24C7BF7C-C07A-6349-9CB2-82C63BDA9817}" type="sibTrans" cxnId="{139D7646-AEC5-3549-B0E9-279ECFBA1658}">
+      <dgm:prSet/>
+      <dgm:spPr/>
+    </dgm:pt>
     <dgm:pt modelId="{3C94FD36-29F5-B040-996E-33D8CCAEB85A}" type="pres">
       <dgm:prSet presAssocID="{898C5174-94EB-DE4C-AE3B-D66DB0F289F0}" presName="Name0" presStyleCnt="0">
         <dgm:presLayoutVars>
@@ -1655,11 +1674,11 @@
       <dgm:spPr/>
     </dgm:pt>
     <dgm:pt modelId="{10D500A6-E33C-2340-9790-6D50B4EB2351}" type="pres">
-      <dgm:prSet presAssocID="{B0897C2B-562B-EA49-959A-75313E19660D}" presName="parTrans" presStyleLbl="sibTrans2D1" presStyleIdx="0" presStyleCnt="13"/>
+      <dgm:prSet presAssocID="{B0897C2B-562B-EA49-959A-75313E19660D}" presName="parTrans" presStyleLbl="sibTrans2D1" presStyleIdx="0" presStyleCnt="14"/>
       <dgm:spPr/>
     </dgm:pt>
     <dgm:pt modelId="{6388C5A6-F5F1-094A-A5D4-5B7DF26E9699}" type="pres">
-      <dgm:prSet presAssocID="{02AC17F7-5E74-6745-9785-3B378A9EA37B}" presName="child" presStyleLbl="alignAccFollowNode1" presStyleIdx="0" presStyleCnt="13" custScaleY="175611">
+      <dgm:prSet presAssocID="{02AC17F7-5E74-6745-9785-3B378A9EA37B}" presName="child" presStyleLbl="alignAccFollowNode1" presStyleIdx="0" presStyleCnt="14" custScaleY="175611">
         <dgm:presLayoutVars>
           <dgm:chMax val="0"/>
           <dgm:bulletEnabled val="1"/>
@@ -1668,11 +1687,11 @@
       <dgm:spPr/>
     </dgm:pt>
     <dgm:pt modelId="{242EBDB3-BF34-904E-A317-EBF6A1858597}" type="pres">
-      <dgm:prSet presAssocID="{94E579BA-08D4-DB43-9A9F-0F39E7B32246}" presName="sibTrans" presStyleLbl="sibTrans2D1" presStyleIdx="1" presStyleCnt="13"/>
+      <dgm:prSet presAssocID="{94E579BA-08D4-DB43-9A9F-0F39E7B32246}" presName="sibTrans" presStyleLbl="sibTrans2D1" presStyleIdx="1" presStyleCnt="14"/>
       <dgm:spPr/>
     </dgm:pt>
     <dgm:pt modelId="{64541A2E-0A5B-784F-AFBC-8947BF3F52CA}" type="pres">
-      <dgm:prSet presAssocID="{428DF7DD-2102-5B45-B530-68319393841E}" presName="child" presStyleLbl="alignAccFollowNode1" presStyleIdx="1" presStyleCnt="13" custScaleY="175611">
+      <dgm:prSet presAssocID="{428DF7DD-2102-5B45-B530-68319393841E}" presName="child" presStyleLbl="alignAccFollowNode1" presStyleIdx="1" presStyleCnt="14" custScaleY="175611">
         <dgm:presLayoutVars>
           <dgm:chMax val="0"/>
           <dgm:bulletEnabled val="1"/>
@@ -1681,11 +1700,11 @@
       <dgm:spPr/>
     </dgm:pt>
     <dgm:pt modelId="{B59D26C6-8805-4F4F-9EFD-4D187FA5A925}" type="pres">
-      <dgm:prSet presAssocID="{75F68DEE-DA29-7449-ACBA-F7840EA3C2BC}" presName="sibTrans" presStyleLbl="sibTrans2D1" presStyleIdx="2" presStyleCnt="13"/>
+      <dgm:prSet presAssocID="{75F68DEE-DA29-7449-ACBA-F7840EA3C2BC}" presName="sibTrans" presStyleLbl="sibTrans2D1" presStyleIdx="2" presStyleCnt="14"/>
       <dgm:spPr/>
     </dgm:pt>
     <dgm:pt modelId="{294EA16D-1E26-8443-8359-102D903AF8E7}" type="pres">
-      <dgm:prSet presAssocID="{594F6612-34DE-6641-9E12-DFDDFEE9039E}" presName="child" presStyleLbl="alignAccFollowNode1" presStyleIdx="2" presStyleCnt="13" custScaleY="175611">
+      <dgm:prSet presAssocID="{594F6612-34DE-6641-9E12-DFDDFEE9039E}" presName="child" presStyleLbl="alignAccFollowNode1" presStyleIdx="2" presStyleCnt="14" custScaleY="175611">
         <dgm:presLayoutVars>
           <dgm:chMax val="0"/>
           <dgm:bulletEnabled val="1"/>
@@ -1706,11 +1725,11 @@
       <dgm:spPr/>
     </dgm:pt>
     <dgm:pt modelId="{3354D689-792B-BF41-8E28-F8CA6A7F8841}" type="pres">
-      <dgm:prSet presAssocID="{2065DA7C-E00F-DF43-98B9-4566BA3604D9}" presName="parTrans" presStyleLbl="sibTrans2D1" presStyleIdx="3" presStyleCnt="13"/>
+      <dgm:prSet presAssocID="{2065DA7C-E00F-DF43-98B9-4566BA3604D9}" presName="parTrans" presStyleLbl="sibTrans2D1" presStyleIdx="3" presStyleCnt="14"/>
       <dgm:spPr/>
     </dgm:pt>
     <dgm:pt modelId="{841E770B-5AEA-1C46-8545-C41C43D05ECC}" type="pres">
-      <dgm:prSet presAssocID="{36D7BCDA-E4BB-D949-B466-57ECDB73EDE9}" presName="child" presStyleLbl="alignAccFollowNode1" presStyleIdx="3" presStyleCnt="13" custScaleY="175611">
+      <dgm:prSet presAssocID="{36D7BCDA-E4BB-D949-B466-57ECDB73EDE9}" presName="child" presStyleLbl="alignAccFollowNode1" presStyleIdx="3" presStyleCnt="14" custScaleY="175611">
         <dgm:presLayoutVars>
           <dgm:chMax val="0"/>
           <dgm:bulletEnabled val="1"/>
@@ -1719,11 +1738,11 @@
       <dgm:spPr/>
     </dgm:pt>
     <dgm:pt modelId="{6C2A8A67-2B11-7746-8141-CB9515E7AF09}" type="pres">
-      <dgm:prSet presAssocID="{E3A6FF26-83D7-0D46-AAD1-87EBD83B17FF}" presName="sibTrans" presStyleLbl="sibTrans2D1" presStyleIdx="4" presStyleCnt="13"/>
+      <dgm:prSet presAssocID="{E3A6FF26-83D7-0D46-AAD1-87EBD83B17FF}" presName="sibTrans" presStyleLbl="sibTrans2D1" presStyleIdx="4" presStyleCnt="14"/>
       <dgm:spPr/>
     </dgm:pt>
     <dgm:pt modelId="{FB4EA5B9-A235-2144-B5D9-BE5BDE1FEAA3}" type="pres">
-      <dgm:prSet presAssocID="{8824B295-8C25-2141-B5D6-F2B4B926FBF3}" presName="child" presStyleLbl="alignAccFollowNode1" presStyleIdx="4" presStyleCnt="13" custScaleY="175611">
+      <dgm:prSet presAssocID="{8824B295-8C25-2141-B5D6-F2B4B926FBF3}" presName="child" presStyleLbl="alignAccFollowNode1" presStyleIdx="4" presStyleCnt="14" custScaleY="175611">
         <dgm:presLayoutVars>
           <dgm:chMax val="0"/>
           <dgm:bulletEnabled val="1"/>
@@ -1732,11 +1751,11 @@
       <dgm:spPr/>
     </dgm:pt>
     <dgm:pt modelId="{E1583A09-4CA6-9743-9A41-03E64C4D547D}" type="pres">
-      <dgm:prSet presAssocID="{1ACA25C6-EA6B-6642-BC61-EE6254D3DC01}" presName="sibTrans" presStyleLbl="sibTrans2D1" presStyleIdx="5" presStyleCnt="13"/>
+      <dgm:prSet presAssocID="{1ACA25C6-EA6B-6642-BC61-EE6254D3DC01}" presName="sibTrans" presStyleLbl="sibTrans2D1" presStyleIdx="5" presStyleCnt="14"/>
       <dgm:spPr/>
     </dgm:pt>
     <dgm:pt modelId="{710EFF23-8AB5-1748-B753-14EC1981A01A}" type="pres">
-      <dgm:prSet presAssocID="{B2E55E24-76C8-7447-996F-8B6075884977}" presName="child" presStyleLbl="alignAccFollowNode1" presStyleIdx="5" presStyleCnt="13" custScaleY="175611">
+      <dgm:prSet presAssocID="{B2E55E24-76C8-7447-996F-8B6075884977}" presName="child" presStyleLbl="alignAccFollowNode1" presStyleIdx="5" presStyleCnt="14" custScaleY="175611">
         <dgm:presLayoutVars>
           <dgm:chMax val="0"/>
           <dgm:bulletEnabled val="1"/>
@@ -1757,11 +1776,11 @@
       <dgm:spPr/>
     </dgm:pt>
     <dgm:pt modelId="{416B8FE7-7D59-1F4D-A25C-34ABB384F8D1}" type="pres">
-      <dgm:prSet presAssocID="{305299C0-EE81-A048-8DB5-7E48C24901BE}" presName="parTrans" presStyleLbl="sibTrans2D1" presStyleIdx="6" presStyleCnt="13"/>
+      <dgm:prSet presAssocID="{305299C0-EE81-A048-8DB5-7E48C24901BE}" presName="parTrans" presStyleLbl="sibTrans2D1" presStyleIdx="6" presStyleCnt="14"/>
       <dgm:spPr/>
     </dgm:pt>
     <dgm:pt modelId="{9A1B8672-2CE8-414D-A672-BA69FB633BAE}" type="pres">
-      <dgm:prSet presAssocID="{3009B096-D069-BC42-999A-AAB67DBDCD5B}" presName="child" presStyleLbl="alignAccFollowNode1" presStyleIdx="6" presStyleCnt="13" custScaleY="175611">
+      <dgm:prSet presAssocID="{3009B096-D069-BC42-999A-AAB67DBDCD5B}" presName="child" presStyleLbl="alignAccFollowNode1" presStyleIdx="6" presStyleCnt="14" custScaleY="175611">
         <dgm:presLayoutVars>
           <dgm:chMax val="0"/>
           <dgm:bulletEnabled val="1"/>
@@ -1770,11 +1789,11 @@
       <dgm:spPr/>
     </dgm:pt>
     <dgm:pt modelId="{1073260A-A87E-1042-8C61-FD32C3E2990B}" type="pres">
-      <dgm:prSet presAssocID="{A8135A5B-A489-154D-AB47-B48D2B32DB8F}" presName="sibTrans" presStyleLbl="sibTrans2D1" presStyleIdx="7" presStyleCnt="13"/>
+      <dgm:prSet presAssocID="{A8135A5B-A489-154D-AB47-B48D2B32DB8F}" presName="sibTrans" presStyleLbl="sibTrans2D1" presStyleIdx="7" presStyleCnt="14"/>
       <dgm:spPr/>
     </dgm:pt>
     <dgm:pt modelId="{7073CD36-6660-9B4A-B4AD-3F40083033A6}" type="pres">
-      <dgm:prSet presAssocID="{24E20B78-1FFC-B145-9924-C57F6F9CA4EC}" presName="child" presStyleLbl="alignAccFollowNode1" presStyleIdx="7" presStyleCnt="13" custScaleY="175611">
+      <dgm:prSet presAssocID="{24E20B78-1FFC-B145-9924-C57F6F9CA4EC}" presName="child" presStyleLbl="alignAccFollowNode1" presStyleIdx="7" presStyleCnt="14" custScaleY="175611">
         <dgm:presLayoutVars>
           <dgm:chMax val="0"/>
           <dgm:bulletEnabled val="1"/>
@@ -1795,11 +1814,24 @@
       <dgm:spPr/>
     </dgm:pt>
     <dgm:pt modelId="{F2A709A2-1CA5-9646-9DB5-432064AF85DB}" type="pres">
-      <dgm:prSet presAssocID="{4EFBDC61-BCE7-D941-8D24-C1E2FF152611}" presName="parTrans" presStyleLbl="sibTrans2D1" presStyleIdx="8" presStyleCnt="13"/>
+      <dgm:prSet presAssocID="{4EFBDC61-BCE7-D941-8D24-C1E2FF152611}" presName="parTrans" presStyleLbl="sibTrans2D1" presStyleIdx="8" presStyleCnt="14"/>
       <dgm:spPr/>
     </dgm:pt>
     <dgm:pt modelId="{181593FC-C2EE-394F-A114-1882CB1CAD2E}" type="pres">
-      <dgm:prSet presAssocID="{BB7673A4-F943-8E4E-B238-23871B057044}" presName="child" presStyleLbl="alignAccFollowNode1" presStyleIdx="8" presStyleCnt="13" custScaleY="175611">
+      <dgm:prSet presAssocID="{BB7673A4-F943-8E4E-B238-23871B057044}" presName="child" presStyleLbl="alignAccFollowNode1" presStyleIdx="8" presStyleCnt="14" custScaleY="175611">
+        <dgm:presLayoutVars>
+          <dgm:chMax val="0"/>
+          <dgm:bulletEnabled val="1"/>
+        </dgm:presLayoutVars>
+      </dgm:prSet>
+      <dgm:spPr/>
+    </dgm:pt>
+    <dgm:pt modelId="{758E231E-8680-F549-B7A8-FE13BFE4DDA2}" type="pres">
+      <dgm:prSet presAssocID="{2DE8218A-03EB-9B40-BD8D-AA5F2135817D}" presName="sibTrans" presStyleLbl="sibTrans2D1" presStyleIdx="9" presStyleCnt="14"/>
+      <dgm:spPr/>
+    </dgm:pt>
+    <dgm:pt modelId="{8713C547-0B5A-CA4D-B624-8C6CEA60647B}" type="pres">
+      <dgm:prSet presAssocID="{0336D323-6245-634F-B716-9221B6DC46A7}" presName="child" presStyleLbl="alignAccFollowNode1" presStyleIdx="9" presStyleCnt="14">
         <dgm:presLayoutVars>
           <dgm:chMax val="0"/>
           <dgm:bulletEnabled val="1"/>
@@ -1820,11 +1852,11 @@
       <dgm:spPr/>
     </dgm:pt>
     <dgm:pt modelId="{0E4E1DC6-D79B-7A43-A6A4-7AAEB5BA0D36}" type="pres">
-      <dgm:prSet presAssocID="{0B0F90B6-506E-6649-873A-AD3FE1CD4A16}" presName="parTrans" presStyleLbl="sibTrans2D1" presStyleIdx="9" presStyleCnt="13"/>
+      <dgm:prSet presAssocID="{0B0F90B6-506E-6649-873A-AD3FE1CD4A16}" presName="parTrans" presStyleLbl="sibTrans2D1" presStyleIdx="10" presStyleCnt="14"/>
       <dgm:spPr/>
     </dgm:pt>
     <dgm:pt modelId="{CD31F6B9-66D4-8549-8593-9EF82007421A}" type="pres">
-      <dgm:prSet presAssocID="{2494E046-A293-8743-94A9-816F9B727893}" presName="child" presStyleLbl="alignAccFollowNode1" presStyleIdx="9" presStyleCnt="13" custScaleY="175611">
+      <dgm:prSet presAssocID="{2494E046-A293-8743-94A9-816F9B727893}" presName="child" presStyleLbl="alignAccFollowNode1" presStyleIdx="10" presStyleCnt="14" custScaleY="175611">
         <dgm:presLayoutVars>
           <dgm:chMax val="0"/>
           <dgm:bulletEnabled val="1"/>
@@ -1833,11 +1865,11 @@
       <dgm:spPr/>
     </dgm:pt>
     <dgm:pt modelId="{031ABB83-D440-6D4B-8064-F980922F428F}" type="pres">
-      <dgm:prSet presAssocID="{6685ED33-CF31-BB4A-8F70-22E7395E2FC3}" presName="sibTrans" presStyleLbl="sibTrans2D1" presStyleIdx="10" presStyleCnt="13"/>
+      <dgm:prSet presAssocID="{6685ED33-CF31-BB4A-8F70-22E7395E2FC3}" presName="sibTrans" presStyleLbl="sibTrans2D1" presStyleIdx="11" presStyleCnt="14"/>
       <dgm:spPr/>
     </dgm:pt>
     <dgm:pt modelId="{381A3F45-9589-234A-8154-A2B679621008}" type="pres">
-      <dgm:prSet presAssocID="{48B98B79-FEDE-DD4D-BDAB-497F3C278C88}" presName="child" presStyleLbl="alignAccFollowNode1" presStyleIdx="10" presStyleCnt="13" custScaleY="175611">
+      <dgm:prSet presAssocID="{48B98B79-FEDE-DD4D-BDAB-497F3C278C88}" presName="child" presStyleLbl="alignAccFollowNode1" presStyleIdx="11" presStyleCnt="14" custScaleY="175611">
         <dgm:presLayoutVars>
           <dgm:chMax val="0"/>
           <dgm:bulletEnabled val="1"/>
@@ -1858,11 +1890,11 @@
       <dgm:spPr/>
     </dgm:pt>
     <dgm:pt modelId="{B6D64924-3669-9347-BC66-29FB0474CBE3}" type="pres">
-      <dgm:prSet presAssocID="{8EE4858B-65E3-2A4D-99E7-8292BFDE5632}" presName="parTrans" presStyleLbl="sibTrans2D1" presStyleIdx="11" presStyleCnt="13"/>
+      <dgm:prSet presAssocID="{8EE4858B-65E3-2A4D-99E7-8292BFDE5632}" presName="parTrans" presStyleLbl="sibTrans2D1" presStyleIdx="12" presStyleCnt="14"/>
       <dgm:spPr/>
     </dgm:pt>
     <dgm:pt modelId="{4B2731B8-55E5-7D42-B17A-D23E6665319E}" type="pres">
-      <dgm:prSet presAssocID="{5D58C598-F7AF-E74A-8F28-DCBE13C03583}" presName="child" presStyleLbl="alignAccFollowNode1" presStyleIdx="11" presStyleCnt="13" custScaleY="175611">
+      <dgm:prSet presAssocID="{5D58C598-F7AF-E74A-8F28-DCBE13C03583}" presName="child" presStyleLbl="alignAccFollowNode1" presStyleIdx="12" presStyleCnt="14" custScaleY="175611">
         <dgm:presLayoutVars>
           <dgm:chMax val="0"/>
           <dgm:bulletEnabled val="1"/>
@@ -1883,11 +1915,11 @@
       <dgm:spPr/>
     </dgm:pt>
     <dgm:pt modelId="{4392A30B-F377-954A-B7E2-CA21997708C9}" type="pres">
-      <dgm:prSet presAssocID="{AB3DD5B1-85E0-254E-BC33-E80C42A5C887}" presName="parTrans" presStyleLbl="sibTrans2D1" presStyleIdx="12" presStyleCnt="13"/>
+      <dgm:prSet presAssocID="{AB3DD5B1-85E0-254E-BC33-E80C42A5C887}" presName="parTrans" presStyleLbl="sibTrans2D1" presStyleIdx="13" presStyleCnt="14"/>
       <dgm:spPr/>
     </dgm:pt>
     <dgm:pt modelId="{A1294BDB-B6AB-5840-8AB7-64B756FBD7BC}" type="pres">
-      <dgm:prSet presAssocID="{C76077C3-7A17-2240-9520-9F8FD22D4FC9}" presName="child" presStyleLbl="alignAccFollowNode1" presStyleIdx="12" presStyleCnt="13" custScaleY="175611">
+      <dgm:prSet presAssocID="{C76077C3-7A17-2240-9520-9F8FD22D4FC9}" presName="child" presStyleLbl="alignAccFollowNode1" presStyleIdx="13" presStyleCnt="14" custScaleY="175611">
         <dgm:presLayoutVars>
           <dgm:chMax val="0"/>
           <dgm:bulletEnabled val="1"/>
@@ -1908,12 +1940,14 @@
     <dgm:cxn modelId="{55A97E39-1BB4-3B47-B800-DB6275EE1C3D}" srcId="{A57B4573-9752-CE4D-9B21-F03FAC0A4E98}" destId="{428DF7DD-2102-5B45-B530-68319393841E}" srcOrd="1" destOrd="0" parTransId="{7C92E14B-A571-5D47-A653-45CA5D50385D}" sibTransId="{75F68DEE-DA29-7449-ACBA-F7840EA3C2BC}"/>
     <dgm:cxn modelId="{F8DF273B-42A8-D24B-A4B9-334B8B17FA31}" type="presOf" srcId="{AB3DD5B1-85E0-254E-BC33-E80C42A5C887}" destId="{4392A30B-F377-954A-B7E2-CA21997708C9}" srcOrd="0" destOrd="0" presId="urn:microsoft.com/office/officeart/2005/8/layout/lProcess1"/>
     <dgm:cxn modelId="{6A106E3C-D3D9-B74B-8A4A-1B830A72840A}" type="presOf" srcId="{6F9E8415-7BEB-F545-9AD1-F97E43387DF1}" destId="{4ADE6C04-70AD-0446-B6FD-35079C49FFD6}" srcOrd="0" destOrd="0" presId="urn:microsoft.com/office/officeart/2005/8/layout/lProcess1"/>
+    <dgm:cxn modelId="{139D7646-AEC5-3549-B0E9-279ECFBA1658}" srcId="{6F9E8415-7BEB-F545-9AD1-F97E43387DF1}" destId="{0336D323-6245-634F-B716-9221B6DC46A7}" srcOrd="1" destOrd="0" parTransId="{76EBCC91-E722-F949-AE8E-1B904140F7D5}" sibTransId="{24C7BF7C-C07A-6349-9CB2-82C63BDA9817}"/>
     <dgm:cxn modelId="{7B08EE47-3F1D-534D-9D3B-574823960D9D}" type="presOf" srcId="{3009B096-D069-BC42-999A-AAB67DBDCD5B}" destId="{9A1B8672-2CE8-414D-A672-BA69FB633BAE}" srcOrd="0" destOrd="0" presId="urn:microsoft.com/office/officeart/2005/8/layout/lProcess1"/>
     <dgm:cxn modelId="{CDDD0A57-37D2-624B-9F21-C45CA249D95F}" type="presOf" srcId="{A57B4573-9752-CE4D-9B21-F03FAC0A4E98}" destId="{C3765B1C-8156-7444-81F2-9D0293BA5615}" srcOrd="0" destOrd="0" presId="urn:microsoft.com/office/officeart/2005/8/layout/lProcess1"/>
     <dgm:cxn modelId="{21A38D57-FC9C-8740-B066-B3D00FD535C3}" type="presOf" srcId="{C76077C3-7A17-2240-9520-9F8FD22D4FC9}" destId="{A1294BDB-B6AB-5840-8AB7-64B756FBD7BC}" srcOrd="0" destOrd="0" presId="urn:microsoft.com/office/officeart/2005/8/layout/lProcess1"/>
     <dgm:cxn modelId="{3496325A-5ED3-5D47-B49C-BE15AE6AB171}" type="presOf" srcId="{898C5174-94EB-DE4C-AE3B-D66DB0F289F0}" destId="{3C94FD36-29F5-B040-996E-33D8CCAEB85A}" srcOrd="0" destOrd="0" presId="urn:microsoft.com/office/officeart/2005/8/layout/lProcess1"/>
     <dgm:cxn modelId="{43194C5A-3BA4-4642-B787-06E48B7B7851}" type="presOf" srcId="{36D7BCDA-E4BB-D949-B466-57ECDB73EDE9}" destId="{841E770B-5AEA-1C46-8545-C41C43D05ECC}" srcOrd="0" destOrd="0" presId="urn:microsoft.com/office/officeart/2005/8/layout/lProcess1"/>
     <dgm:cxn modelId="{A332BA5D-CEAC-2249-8B63-76DD614B6592}" type="presOf" srcId="{E3A6FF26-83D7-0D46-AAD1-87EBD83B17FF}" destId="{6C2A8A67-2B11-7746-8141-CB9515E7AF09}" srcOrd="0" destOrd="0" presId="urn:microsoft.com/office/officeart/2005/8/layout/lProcess1"/>
+    <dgm:cxn modelId="{BA176960-8D75-B542-9F81-4D90DE216F08}" type="presOf" srcId="{0336D323-6245-634F-B716-9221B6DC46A7}" destId="{8713C547-0B5A-CA4D-B624-8C6CEA60647B}" srcOrd="0" destOrd="0" presId="urn:microsoft.com/office/officeart/2005/8/layout/lProcess1"/>
     <dgm:cxn modelId="{D5C04162-6154-6443-8E14-ACCAA3B3A607}" srcId="{FBE2640A-87D5-4F47-96EB-2F1CB70D5AF3}" destId="{36D7BCDA-E4BB-D949-B466-57ECDB73EDE9}" srcOrd="0" destOrd="0" parTransId="{2065DA7C-E00F-DF43-98B9-4566BA3604D9}" sibTransId="{E3A6FF26-83D7-0D46-AAD1-87EBD83B17FF}"/>
     <dgm:cxn modelId="{CF158D67-D2DE-B146-8A6B-045344D15DB8}" type="presOf" srcId="{FBE2640A-87D5-4F47-96EB-2F1CB70D5AF3}" destId="{73B0273D-7348-4042-9720-ACA5A59E2CA7}" srcOrd="0" destOrd="0" presId="urn:microsoft.com/office/officeart/2005/8/layout/lProcess1"/>
     <dgm:cxn modelId="{93835968-703A-0C49-BA82-CFAF41C438DB}" srcId="{898C5174-94EB-DE4C-AE3B-D66DB0F289F0}" destId="{58A80F11-9CE8-1848-8441-1AD38C2CABBA}" srcOrd="4" destOrd="0" parTransId="{6E9FE33B-4105-B349-B60B-EA250A39AA2B}" sibTransId="{B8AC3FEC-6472-C946-956E-0FEF0FCF7CC0}"/>
@@ -1941,6 +1975,7 @@
     <dgm:cxn modelId="{6EC460CC-0E7A-4F40-80DF-73D262BD17D6}" type="presOf" srcId="{A9DEE4AD-093B-E44C-AE89-A6B765379BE9}" destId="{CD251BD9-1808-994A-9D7B-44D585859501}" srcOrd="0" destOrd="0" presId="urn:microsoft.com/office/officeart/2005/8/layout/lProcess1"/>
     <dgm:cxn modelId="{E52767CC-154E-5E47-8ECF-9BBB4FD4525C}" srcId="{5A893E2B-E89B-BE4C-AF3C-5533CC0FD0E6}" destId="{3009B096-D069-BC42-999A-AAB67DBDCD5B}" srcOrd="0" destOrd="0" parTransId="{305299C0-EE81-A048-8DB5-7E48C24901BE}" sibTransId="{A8135A5B-A489-154D-AB47-B48D2B32DB8F}"/>
     <dgm:cxn modelId="{B3D281CE-2209-6D43-BC82-5546F1126DA8}" type="presOf" srcId="{2494E046-A293-8743-94A9-816F9B727893}" destId="{CD31F6B9-66D4-8549-8593-9EF82007421A}" srcOrd="0" destOrd="0" presId="urn:microsoft.com/office/officeart/2005/8/layout/lProcess1"/>
+    <dgm:cxn modelId="{E3C89AD3-0E9A-624F-91D2-14C3D9D52FBA}" type="presOf" srcId="{2DE8218A-03EB-9B40-BD8D-AA5F2135817D}" destId="{758E231E-8680-F549-B7A8-FE13BFE4DDA2}" srcOrd="0" destOrd="0" presId="urn:microsoft.com/office/officeart/2005/8/layout/lProcess1"/>
     <dgm:cxn modelId="{F95C60D4-1F93-2048-B222-B2546D292EDA}" srcId="{2E16D0EE-0153-BD40-A3C5-6A1928FAA4F5}" destId="{C76077C3-7A17-2240-9520-9F8FD22D4FC9}" srcOrd="0" destOrd="0" parTransId="{AB3DD5B1-85E0-254E-BC33-E80C42A5C887}" sibTransId="{C15CFBC9-C655-414C-BB48-A039B30C163B}"/>
     <dgm:cxn modelId="{CF6033D7-87BF-A043-ACA2-16EB973FBB45}" srcId="{898C5174-94EB-DE4C-AE3B-D66DB0F289F0}" destId="{A9DEE4AD-093B-E44C-AE89-A6B765379BE9}" srcOrd="5" destOrd="0" parTransId="{D31C39F1-7D99-2F45-B788-D64924B0E588}" sibTransId="{018965DC-3115-9E4E-9D12-C195B3E6C2F8}"/>
     <dgm:cxn modelId="{5A05C9D7-CEB6-734E-9C6E-9BCB4CC8A62A}" type="presOf" srcId="{2065DA7C-E00F-DF43-98B9-4566BA3604D9}" destId="{3354D689-792B-BF41-8E28-F8CA6A7F8841}" srcOrd="0" destOrd="0" presId="urn:microsoft.com/office/officeart/2005/8/layout/lProcess1"/>
@@ -1980,6 +2015,8 @@
     <dgm:cxn modelId="{D7DD4A49-CC92-5646-BCC5-2639C5CE0817}" type="presParOf" srcId="{87F2CB93-D044-0E49-AE2C-0D110FCDED16}" destId="{4ADE6C04-70AD-0446-B6FD-35079C49FFD6}" srcOrd="0" destOrd="0" presId="urn:microsoft.com/office/officeart/2005/8/layout/lProcess1"/>
     <dgm:cxn modelId="{F431E185-AE5C-7D42-A490-06E4A6E54F86}" type="presParOf" srcId="{87F2CB93-D044-0E49-AE2C-0D110FCDED16}" destId="{F2A709A2-1CA5-9646-9DB5-432064AF85DB}" srcOrd="1" destOrd="0" presId="urn:microsoft.com/office/officeart/2005/8/layout/lProcess1"/>
     <dgm:cxn modelId="{E09CEE02-E827-7749-BAD0-07503C350701}" type="presParOf" srcId="{87F2CB93-D044-0E49-AE2C-0D110FCDED16}" destId="{181593FC-C2EE-394F-A114-1882CB1CAD2E}" srcOrd="2" destOrd="0" presId="urn:microsoft.com/office/officeart/2005/8/layout/lProcess1"/>
+    <dgm:cxn modelId="{5B699A40-A0C5-544D-85C9-26A5F570B339}" type="presParOf" srcId="{87F2CB93-D044-0E49-AE2C-0D110FCDED16}" destId="{758E231E-8680-F549-B7A8-FE13BFE4DDA2}" srcOrd="3" destOrd="0" presId="urn:microsoft.com/office/officeart/2005/8/layout/lProcess1"/>
+    <dgm:cxn modelId="{868738FC-17A8-FC4D-ABC5-0E165BC22E64}" type="presParOf" srcId="{87F2CB93-D044-0E49-AE2C-0D110FCDED16}" destId="{8713C547-0B5A-CA4D-B624-8C6CEA60647B}" srcOrd="4" destOrd="0" presId="urn:microsoft.com/office/officeart/2005/8/layout/lProcess1"/>
     <dgm:cxn modelId="{BF18EE07-1E9E-6D47-B5F4-7626245F0802}" type="presParOf" srcId="{3C94FD36-29F5-B040-996E-33D8CCAEB85A}" destId="{AD39B9FA-B929-2749-BF9E-DDC3F9313856}" srcOrd="7" destOrd="0" presId="urn:microsoft.com/office/officeart/2005/8/layout/lProcess1"/>
     <dgm:cxn modelId="{C147EFCF-6B1F-C948-AF88-4D86199D1E5E}" type="presParOf" srcId="{3C94FD36-29F5-B040-996E-33D8CCAEB85A}" destId="{C285EBB2-DA73-2B43-B5A4-60AB48B3369D}" srcOrd="8" destOrd="0" presId="urn:microsoft.com/office/officeart/2005/8/layout/lProcess1"/>
     <dgm:cxn modelId="{8C2818FE-2F48-4140-988D-079860FEF4AB}" type="presParOf" srcId="{C285EBB2-DA73-2B43-B5A4-60AB48B3369D}" destId="{293EE86D-6C95-C54D-B190-C6810E79A98B}" srcOrd="0" destOrd="0" presId="urn:microsoft.com/office/officeart/2005/8/layout/lProcess1"/>
@@ -3474,13 +3511,136 @@
                 <a:srgbClr val="FF0000"/>
               </a:solidFill>
             </a:rPr>
-            <a:t>*Need to update</a:t>
+            <a:t>Trim Data</a:t>
           </a:r>
         </a:p>
       </dsp:txBody>
       <dsp:txXfrm>
         <a:off x="5076663" y="1777190"/>
         <a:ext cx="1440157" cy="610944"/>
+      </dsp:txXfrm>
+    </dsp:sp>
+    <dsp:sp modelId="{758E231E-8680-F549-B7A8-FE13BFE4DDA2}">
+      <dsp:nvSpPr>
+        <dsp:cNvPr id="0" name=""/>
+        <dsp:cNvSpPr/>
+      </dsp:nvSpPr>
+      <dsp:spPr>
+        <a:xfrm rot="5400000">
+          <a:off x="5764406" y="2439476"/>
+          <a:ext cx="64670" cy="64670"/>
+        </a:xfrm>
+        <a:prstGeom prst="rightArrow">
+          <a:avLst>
+            <a:gd name="adj1" fmla="val 66700"/>
+            <a:gd name="adj2" fmla="val 50000"/>
+          </a:avLst>
+        </a:prstGeom>
+        <a:solidFill>
+          <a:schemeClr val="accent1">
+            <a:tint val="60000"/>
+            <a:hueOff val="0"/>
+            <a:satOff val="0"/>
+            <a:lumOff val="0"/>
+            <a:alphaOff val="0"/>
+          </a:schemeClr>
+        </a:solidFill>
+        <a:ln>
+          <a:noFill/>
+        </a:ln>
+        <a:effectLst/>
+      </dsp:spPr>
+      <dsp:style>
+        <a:lnRef idx="0">
+          <a:scrgbClr r="0" g="0" b="0"/>
+        </a:lnRef>
+        <a:fillRef idx="1">
+          <a:scrgbClr r="0" g="0" b="0"/>
+        </a:fillRef>
+        <a:effectRef idx="0">
+          <a:scrgbClr r="0" g="0" b="0"/>
+        </a:effectRef>
+        <a:fontRef idx="minor">
+          <a:schemeClr val="lt1"/>
+        </a:fontRef>
+      </dsp:style>
+    </dsp:sp>
+    <dsp:sp modelId="{8713C547-0B5A-CA4D-B624-8C6CEA60647B}">
+      <dsp:nvSpPr>
+        <dsp:cNvPr id="0" name=""/>
+        <dsp:cNvSpPr/>
+      </dsp:nvSpPr>
+      <dsp:spPr>
+        <a:xfrm>
+          <a:off x="5057656" y="2536481"/>
+          <a:ext cx="1478171" cy="369542"/>
+        </a:xfrm>
+        <a:prstGeom prst="roundRect">
+          <a:avLst>
+            <a:gd name="adj" fmla="val 10000"/>
+          </a:avLst>
+        </a:prstGeom>
+        <a:solidFill>
+          <a:schemeClr val="accent1">
+            <a:alpha val="90000"/>
+            <a:tint val="40000"/>
+            <a:hueOff val="0"/>
+            <a:satOff val="0"/>
+            <a:lumOff val="0"/>
+            <a:alphaOff val="0"/>
+          </a:schemeClr>
+        </a:solidFill>
+        <a:ln w="15875" cap="flat" cmpd="sng" algn="ctr">
+          <a:solidFill>
+            <a:schemeClr val="accent1">
+              <a:alpha val="90000"/>
+              <a:tint val="40000"/>
+              <a:hueOff val="0"/>
+              <a:satOff val="0"/>
+              <a:lumOff val="0"/>
+              <a:alphaOff val="0"/>
+            </a:schemeClr>
+          </a:solidFill>
+          <a:prstDash val="solid"/>
+        </a:ln>
+        <a:effectLst/>
+      </dsp:spPr>
+      <dsp:style>
+        <a:lnRef idx="2">
+          <a:scrgbClr r="0" g="0" b="0"/>
+        </a:lnRef>
+        <a:fillRef idx="1">
+          <a:scrgbClr r="0" g="0" b="0"/>
+        </a:fillRef>
+        <a:effectRef idx="0">
+          <a:scrgbClr r="0" g="0" b="0"/>
+        </a:effectRef>
+        <a:fontRef idx="minor"/>
+      </dsp:style>
+      <dsp:txBody>
+        <a:bodyPr spcFirstLastPara="0" vert="horz" wrap="square" lIns="26670" tIns="26670" rIns="26670" bIns="26670" numCol="1" spcCol="1270" anchor="ctr" anchorCtr="0">
+          <a:noAutofit/>
+        </a:bodyPr>
+        <a:lstStyle/>
+        <a:p>
+          <a:pPr marL="0" lvl="0" indent="0" algn="ctr" defTabSz="933450">
+            <a:lnSpc>
+              <a:spcPct val="90000"/>
+            </a:lnSpc>
+            <a:spcBef>
+              <a:spcPct val="0"/>
+            </a:spcBef>
+            <a:spcAft>
+              <a:spcPct val="35000"/>
+            </a:spcAft>
+            <a:buNone/>
+          </a:pPr>
+          <a:endParaRPr lang="en-US" sz="2100" kern="1200"/>
+        </a:p>
+      </dsp:txBody>
+      <dsp:txXfrm>
+        <a:off x="5068480" y="2547305"/>
+        <a:ext cx="1456523" cy="347894"/>
       </dsp:txXfrm>
     </dsp:sp>
     <dsp:sp modelId="{293EE86D-6C95-C54D-B190-C6810E79A98B}">
@@ -4006,10 +4166,10 @@
           <a:r>
             <a:rPr lang="en-US" sz="1400" b="0" kern="1200" dirty="0">
               <a:solidFill>
-                <a:srgbClr val="FF0000"/>
+                <a:schemeClr val="tx1"/>
               </a:solidFill>
             </a:rPr>
-            <a:t>*Need to Update</a:t>
+            <a:t>Choose Graphs of best fit</a:t>
           </a:r>
         </a:p>
       </dsp:txBody>
@@ -4233,10 +4393,10 @@
           <a:r>
             <a:rPr lang="en-US" sz="1400" b="0" kern="1200" dirty="0">
               <a:solidFill>
-                <a:srgbClr val="FF0000"/>
+                <a:schemeClr val="tx1"/>
               </a:solidFill>
             </a:rPr>
-            <a:t>*Need to Update</a:t>
+            <a:t>Use Graphs to spot trends</a:t>
           </a:r>
         </a:p>
       </dsp:txBody>
@@ -5627,7 +5787,7 @@
           <a:p>
             <a:fld id="{B515C4BE-1326-8949-8988-36C34787E2BD}" type="datetimeFigureOut">
               <a:rPr lang="en-US" smtClean="0"/>
-              <a:t>1/10/21</a:t>
+              <a:t>1/11/21</a:t>
             </a:fld>
             <a:endParaRPr lang="en-US"/>
           </a:p>
@@ -6861,7 +7021,7 @@
           <a:p>
             <a:fld id="{48A87A34-81AB-432B-8DAE-1953F412C126}" type="datetimeFigureOut">
               <a:rPr lang="en-US" smtClean="0"/>
-              <a:t>1/10/21</a:t>
+              <a:t>1/11/21</a:t>
             </a:fld>
             <a:endParaRPr lang="en-US" dirty="0"/>
           </a:p>
@@ -7081,7 +7241,7 @@
           <a:p>
             <a:fld id="{48A87A34-81AB-432B-8DAE-1953F412C126}" type="datetimeFigureOut">
               <a:rPr lang="en-US" smtClean="0"/>
-              <a:t>1/10/21</a:t>
+              <a:t>1/11/21</a:t>
             </a:fld>
             <a:endParaRPr lang="en-US" dirty="0"/>
           </a:p>
@@ -7305,7 +7465,7 @@
           <a:p>
             <a:fld id="{48A87A34-81AB-432B-8DAE-1953F412C126}" type="datetimeFigureOut">
               <a:rPr lang="en-US" smtClean="0"/>
-              <a:t>1/10/21</a:t>
+              <a:t>1/11/21</a:t>
             </a:fld>
             <a:endParaRPr lang="en-US" dirty="0"/>
           </a:p>
@@ -7519,7 +7679,7 @@
           <a:p>
             <a:fld id="{48A87A34-81AB-432B-8DAE-1953F412C126}" type="datetimeFigureOut">
               <a:rPr lang="en-US" smtClean="0"/>
-              <a:t>1/10/21</a:t>
+              <a:t>1/11/21</a:t>
             </a:fld>
             <a:endParaRPr lang="en-US" dirty="0"/>
           </a:p>
@@ -7811,7 +7971,7 @@
           <a:p>
             <a:fld id="{48A87A34-81AB-432B-8DAE-1953F412C126}" type="datetimeFigureOut">
               <a:rPr lang="en-US" smtClean="0"/>
-              <a:t>1/10/21</a:t>
+              <a:t>1/11/21</a:t>
             </a:fld>
             <a:endParaRPr lang="en-US" dirty="0"/>
           </a:p>
@@ -8088,7 +8248,7 @@
           <a:p>
             <a:fld id="{48A87A34-81AB-432B-8DAE-1953F412C126}" type="datetimeFigureOut">
               <a:rPr lang="en-US" smtClean="0"/>
-              <a:t>1/10/21</a:t>
+              <a:t>1/11/21</a:t>
             </a:fld>
             <a:endParaRPr lang="en-US" dirty="0"/>
           </a:p>
@@ -8513,7 +8673,7 @@
           <a:p>
             <a:fld id="{48A87A34-81AB-432B-8DAE-1953F412C126}" type="datetimeFigureOut">
               <a:rPr lang="en-US" smtClean="0"/>
-              <a:t>1/10/21</a:t>
+              <a:t>1/11/21</a:t>
             </a:fld>
             <a:endParaRPr lang="en-US" dirty="0"/>
           </a:p>
@@ -8671,7 +8831,7 @@
           <a:p>
             <a:fld id="{48A87A34-81AB-432B-8DAE-1953F412C126}" type="datetimeFigureOut">
               <a:rPr lang="en-US" smtClean="0"/>
-              <a:t>1/10/21</a:t>
+              <a:t>1/11/21</a:t>
             </a:fld>
             <a:endParaRPr lang="en-US" dirty="0"/>
           </a:p>
@@ -8806,7 +8966,7 @@
           <a:p>
             <a:fld id="{48A87A34-81AB-432B-8DAE-1953F412C126}" type="datetimeFigureOut">
               <a:rPr lang="en-US" smtClean="0"/>
-              <a:t>1/10/21</a:t>
+              <a:t>1/11/21</a:t>
             </a:fld>
             <a:endParaRPr lang="en-US" dirty="0"/>
           </a:p>
@@ -9057,7 +9217,7 @@
           <a:p>
             <a:fld id="{48A87A34-81AB-432B-8DAE-1953F412C126}" type="datetimeFigureOut">
               <a:rPr lang="en-US" smtClean="0"/>
-              <a:t>1/10/21</a:t>
+              <a:t>1/11/21</a:t>
             </a:fld>
             <a:endParaRPr lang="en-US" dirty="0"/>
           </a:p>
@@ -9518,7 +9678,7 @@
             <a:fld id="{48A87A34-81AB-432B-8DAE-1953F412C126}" type="datetimeFigureOut">
               <a:rPr lang="en-US" smtClean="0"/>
               <a:pPr/>
-              <a:t>1/10/21</a:t>
+              <a:t>1/11/21</a:t>
             </a:fld>
             <a:endParaRPr lang="en-US" dirty="0"/>
           </a:p>
@@ -9901,7 +10061,7 @@
             <a:fld id="{48A87A34-81AB-432B-8DAE-1953F412C126}" type="datetimeFigureOut">
               <a:rPr lang="en-US" smtClean="0"/>
               <a:pPr/>
-              <a:t>1/10/21</a:t>
+              <a:t>1/11/21</a:t>
             </a:fld>
             <a:endParaRPr lang="en-US" dirty="0"/>
           </a:p>
@@ -10952,7 +11112,7 @@
             <p:ph idx="1"/>
             <p:extLst>
               <p:ext uri="{D42A27DB-BD31-4B8C-83A1-F6EECF244321}">
-                <p14:modId xmlns:p14="http://schemas.microsoft.com/office/powerpoint/2010/main" val="1063196562"/>
+                <p14:modId xmlns:p14="http://schemas.microsoft.com/office/powerpoint/2010/main" val="1587448156"/>
               </p:ext>
             </p:extLst>
           </p:nvPr>

</xml_diff>